<commit_message>
minor: fixed slide footers in class09.
</commit_message>
<xml_diff>
--- a/talks/src/class09.pptx
+++ b/talks/src/class09.pptx
@@ -223,7 +223,7 @@
           <a:p>
             <a:fld id="{56C6788E-680A-49E5-BB93-D456A9D23A29}" type="datetimeFigureOut">
               <a:rPr lang="ru-RU" smtClean="0"/>
-              <a:t>02.12.2018</a:t>
+              <a:t>03.12.2018</a:t>
             </a:fld>
             <a:endParaRPr lang="ru-RU"/>
           </a:p>
@@ -392,7 +392,7 @@
           <a:p>
             <a:fld id="{C4DF4945-C160-4CD5-B124-49B9BE14C0AB}" type="datetimeFigureOut">
               <a:rPr lang="ru-RU" smtClean="0"/>
-              <a:t>02.12.2018</a:t>
+              <a:t>03.12.2018</a:t>
             </a:fld>
             <a:endParaRPr lang="ru-RU"/>
           </a:p>
@@ -2912,7 +2912,7 @@
           <a:p>
             <a:fld id="{12C63722-5D9F-4E99-9720-9B6A0C7BB1C9}" type="datetimeFigureOut">
               <a:rPr lang="ru-RU" smtClean="0"/>
-              <a:t>02.12.2018</a:t>
+              <a:t>03.12.2018</a:t>
             </a:fld>
             <a:endParaRPr lang="ru-RU"/>
           </a:p>
@@ -3082,7 +3082,7 @@
           <a:p>
             <a:fld id="{12C63722-5D9F-4E99-9720-9B6A0C7BB1C9}" type="datetimeFigureOut">
               <a:rPr lang="ru-RU" smtClean="0"/>
-              <a:t>02.12.2018</a:t>
+              <a:t>03.12.2018</a:t>
             </a:fld>
             <a:endParaRPr lang="ru-RU"/>
           </a:p>
@@ -3262,7 +3262,7 @@
           <a:p>
             <a:fld id="{12C63722-5D9F-4E99-9720-9B6A0C7BB1C9}" type="datetimeFigureOut">
               <a:rPr lang="ru-RU" smtClean="0"/>
-              <a:t>02.12.2018</a:t>
+              <a:t>03.12.2018</a:t>
             </a:fld>
             <a:endParaRPr lang="ru-RU"/>
           </a:p>
@@ -3454,7 +3454,7 @@
           <a:p>
             <a:fld id="{8C218C88-2408-4CFC-B25C-07450930B282}" type="datetimeFigureOut">
               <a:rPr lang="ru-RU" smtClean="0"/>
-              <a:t>02.12.2018</a:t>
+              <a:t>03.12.2018</a:t>
             </a:fld>
             <a:endParaRPr lang="ru-RU"/>
           </a:p>
@@ -3624,7 +3624,7 @@
           <a:p>
             <a:fld id="{8C218C88-2408-4CFC-B25C-07450930B282}" type="datetimeFigureOut">
               <a:rPr lang="ru-RU" smtClean="0"/>
-              <a:t>02.12.2018</a:t>
+              <a:t>03.12.2018</a:t>
             </a:fld>
             <a:endParaRPr lang="ru-RU"/>
           </a:p>
@@ -3870,7 +3870,7 @@
           <a:p>
             <a:fld id="{8C218C88-2408-4CFC-B25C-07450930B282}" type="datetimeFigureOut">
               <a:rPr lang="ru-RU" smtClean="0"/>
-              <a:t>02.12.2018</a:t>
+              <a:t>03.12.2018</a:t>
             </a:fld>
             <a:endParaRPr lang="ru-RU"/>
           </a:p>
@@ -4102,7 +4102,7 @@
           <a:p>
             <a:fld id="{8C218C88-2408-4CFC-B25C-07450930B282}" type="datetimeFigureOut">
               <a:rPr lang="ru-RU" smtClean="0"/>
-              <a:t>02.12.2018</a:t>
+              <a:t>03.12.2018</a:t>
             </a:fld>
             <a:endParaRPr lang="ru-RU"/>
           </a:p>
@@ -4469,7 +4469,7 @@
           <a:p>
             <a:fld id="{8C218C88-2408-4CFC-B25C-07450930B282}" type="datetimeFigureOut">
               <a:rPr lang="ru-RU" smtClean="0"/>
-              <a:t>02.12.2018</a:t>
+              <a:t>03.12.2018</a:t>
             </a:fld>
             <a:endParaRPr lang="ru-RU"/>
           </a:p>
@@ -4587,7 +4587,7 @@
           <a:p>
             <a:fld id="{8C218C88-2408-4CFC-B25C-07450930B282}" type="datetimeFigureOut">
               <a:rPr lang="ru-RU" smtClean="0"/>
-              <a:t>02.12.2018</a:t>
+              <a:t>03.12.2018</a:t>
             </a:fld>
             <a:endParaRPr lang="ru-RU"/>
           </a:p>
@@ -4682,7 +4682,7 @@
           <a:p>
             <a:fld id="{8C218C88-2408-4CFC-B25C-07450930B282}" type="datetimeFigureOut">
               <a:rPr lang="ru-RU" smtClean="0"/>
-              <a:t>02.12.2018</a:t>
+              <a:t>03.12.2018</a:t>
             </a:fld>
             <a:endParaRPr lang="ru-RU"/>
           </a:p>
@@ -4959,7 +4959,7 @@
           <a:p>
             <a:fld id="{8C218C88-2408-4CFC-B25C-07450930B282}" type="datetimeFigureOut">
               <a:rPr lang="ru-RU" smtClean="0"/>
-              <a:t>02.12.2018</a:t>
+              <a:t>03.12.2018</a:t>
             </a:fld>
             <a:endParaRPr lang="ru-RU"/>
           </a:p>
@@ -5129,7 +5129,7 @@
           <a:p>
             <a:fld id="{12C63722-5D9F-4E99-9720-9B6A0C7BB1C9}" type="datetimeFigureOut">
               <a:rPr lang="ru-RU" smtClean="0"/>
-              <a:t>02.12.2018</a:t>
+              <a:t>03.12.2018</a:t>
             </a:fld>
             <a:endParaRPr lang="ru-RU"/>
           </a:p>
@@ -5382,7 +5382,7 @@
           <a:p>
             <a:fld id="{8C218C88-2408-4CFC-B25C-07450930B282}" type="datetimeFigureOut">
               <a:rPr lang="ru-RU" smtClean="0"/>
-              <a:t>02.12.2018</a:t>
+              <a:t>03.12.2018</a:t>
             </a:fld>
             <a:endParaRPr lang="ru-RU"/>
           </a:p>
@@ -5552,7 +5552,7 @@
           <a:p>
             <a:fld id="{8C218C88-2408-4CFC-B25C-07450930B282}" type="datetimeFigureOut">
               <a:rPr lang="ru-RU" smtClean="0"/>
-              <a:t>02.12.2018</a:t>
+              <a:t>03.12.2018</a:t>
             </a:fld>
             <a:endParaRPr lang="ru-RU"/>
           </a:p>
@@ -5732,7 +5732,7 @@
           <a:p>
             <a:fld id="{8C218C88-2408-4CFC-B25C-07450930B282}" type="datetimeFigureOut">
               <a:rPr lang="ru-RU" smtClean="0"/>
-              <a:t>02.12.2018</a:t>
+              <a:t>03.12.2018</a:t>
             </a:fld>
             <a:endParaRPr lang="ru-RU"/>
           </a:p>
@@ -5978,7 +5978,7 @@
           <a:p>
             <a:fld id="{12C63722-5D9F-4E99-9720-9B6A0C7BB1C9}" type="datetimeFigureOut">
               <a:rPr lang="ru-RU" smtClean="0"/>
-              <a:t>02.12.2018</a:t>
+              <a:t>03.12.2018</a:t>
             </a:fld>
             <a:endParaRPr lang="ru-RU"/>
           </a:p>
@@ -6218,7 +6218,7 @@
           <a:p>
             <a:fld id="{12C63722-5D9F-4E99-9720-9B6A0C7BB1C9}" type="datetimeFigureOut">
               <a:rPr lang="ru-RU" smtClean="0"/>
-              <a:t>02.12.2018</a:t>
+              <a:t>03.12.2018</a:t>
             </a:fld>
             <a:endParaRPr lang="ru-RU"/>
           </a:p>
@@ -6585,7 +6585,7 @@
           <a:p>
             <a:fld id="{12C63722-5D9F-4E99-9720-9B6A0C7BB1C9}" type="datetimeFigureOut">
               <a:rPr lang="ru-RU" smtClean="0"/>
-              <a:t>02.12.2018</a:t>
+              <a:t>03.12.2018</a:t>
             </a:fld>
             <a:endParaRPr lang="ru-RU"/>
           </a:p>
@@ -6703,7 +6703,7 @@
           <a:p>
             <a:fld id="{12C63722-5D9F-4E99-9720-9B6A0C7BB1C9}" type="datetimeFigureOut">
               <a:rPr lang="ru-RU" smtClean="0"/>
-              <a:t>02.12.2018</a:t>
+              <a:t>03.12.2018</a:t>
             </a:fld>
             <a:endParaRPr lang="ru-RU"/>
           </a:p>
@@ -6798,7 +6798,7 @@
           <a:p>
             <a:fld id="{12C63722-5D9F-4E99-9720-9B6A0C7BB1C9}" type="datetimeFigureOut">
               <a:rPr lang="ru-RU" smtClean="0"/>
-              <a:t>02.12.2018</a:t>
+              <a:t>03.12.2018</a:t>
             </a:fld>
             <a:endParaRPr lang="ru-RU"/>
           </a:p>
@@ -7075,7 +7075,7 @@
           <a:p>
             <a:fld id="{12C63722-5D9F-4E99-9720-9B6A0C7BB1C9}" type="datetimeFigureOut">
               <a:rPr lang="ru-RU" smtClean="0"/>
-              <a:t>02.12.2018</a:t>
+              <a:t>03.12.2018</a:t>
             </a:fld>
             <a:endParaRPr lang="ru-RU"/>
           </a:p>
@@ -7328,7 +7328,7 @@
           <a:p>
             <a:fld id="{12C63722-5D9F-4E99-9720-9B6A0C7BB1C9}" type="datetimeFigureOut">
               <a:rPr lang="ru-RU" smtClean="0"/>
-              <a:t>02.12.2018</a:t>
+              <a:t>03.12.2018</a:t>
             </a:fld>
             <a:endParaRPr lang="ru-RU"/>
           </a:p>
@@ -7541,7 +7541,7 @@
           <a:p>
             <a:fld id="{12C63722-5D9F-4E99-9720-9B6A0C7BB1C9}" type="datetimeFigureOut">
               <a:rPr lang="ru-RU" smtClean="0"/>
-              <a:t>02.12.2018</a:t>
+              <a:t>03.12.2018</a:t>
             </a:fld>
             <a:endParaRPr lang="ru-RU"/>
           </a:p>
@@ -8081,7 +8081,7 @@
           <a:p>
             <a:fld id="{8C218C88-2408-4CFC-B25C-07450930B282}" type="datetimeFigureOut">
               <a:rPr lang="ru-RU" smtClean="0"/>
-              <a:t>02.12.2018</a:t>
+              <a:t>03.12.2018</a:t>
             </a:fld>
             <a:endParaRPr lang="ru-RU"/>
           </a:p>
@@ -8549,7 +8549,7 @@
           <p:nvPr>
             <p:extLst>
               <p:ext uri="{D42A27DB-BD31-4B8C-83A1-F6EECF244321}">
-                <p14:modId xmlns:p14="http://schemas.microsoft.com/office/powerpoint/2010/main" val="4164474727"/>
+                <p14:modId xmlns:p14="http://schemas.microsoft.com/office/powerpoint/2010/main" val="1543929564"/>
               </p:ext>
             </p:extLst>
           </p:nvPr>
@@ -8585,13 +8585,8 @@
                       </a:r>
                       <a:r>
                         <a:rPr lang="ru-RU" dirty="0"/>
-                        <a:t>МФТИ,</a:t>
-                      </a:r>
-                      <a:r>
-                        <a:rPr lang="ru-RU" baseline="0" dirty="0"/>
-                        <a:t> 2016</a:t>
-                      </a:r>
-                      <a:endParaRPr lang="ru-RU" dirty="0"/>
+                        <a:t>МФТИ</a:t>
+                      </a:r>
                     </a:p>
                   </a:txBody>
                   <a:tcPr/>
@@ -19031,7 +19026,7 @@
           <p:nvPr>
             <p:extLst>
               <p:ext uri="{D42A27DB-BD31-4B8C-83A1-F6EECF244321}">
-                <p14:modId xmlns:p14="http://schemas.microsoft.com/office/powerpoint/2010/main" val="4164474727"/>
+                <p14:modId xmlns:p14="http://schemas.microsoft.com/office/powerpoint/2010/main" val="3355911937"/>
               </p:ext>
             </p:extLst>
           </p:nvPr>
@@ -19067,13 +19062,8 @@
                       </a:r>
                       <a:r>
                         <a:rPr lang="ru-RU" dirty="0"/>
-                        <a:t>МФТИ,</a:t>
-                      </a:r>
-                      <a:r>
-                        <a:rPr lang="ru-RU" baseline="0" dirty="0"/>
-                        <a:t> 2016</a:t>
-                      </a:r>
-                      <a:endParaRPr lang="ru-RU" dirty="0"/>
+                        <a:t>МФТИ</a:t>
+                      </a:r>
                     </a:p>
                   </a:txBody>
                   <a:tcPr/>
@@ -20192,7 +20182,7 @@
           <p:nvPr>
             <p:extLst>
               <p:ext uri="{D42A27DB-BD31-4B8C-83A1-F6EECF244321}">
-                <p14:modId xmlns:p14="http://schemas.microsoft.com/office/powerpoint/2010/main" val="4164474727"/>
+                <p14:modId xmlns:p14="http://schemas.microsoft.com/office/powerpoint/2010/main" val="1704996542"/>
               </p:ext>
             </p:extLst>
           </p:nvPr>
@@ -20228,13 +20218,8 @@
                       </a:r>
                       <a:r>
                         <a:rPr lang="ru-RU" dirty="0"/>
-                        <a:t>МФТИ,</a:t>
-                      </a:r>
-                      <a:r>
-                        <a:rPr lang="ru-RU" baseline="0" dirty="0"/>
-                        <a:t> 2016</a:t>
-                      </a:r>
-                      <a:endParaRPr lang="ru-RU" dirty="0"/>
+                        <a:t>МФТИ</a:t>
+                      </a:r>
                     </a:p>
                   </a:txBody>
                   <a:tcPr/>
@@ -20486,7 +20471,7 @@
           <p:nvPr>
             <p:extLst>
               <p:ext uri="{D42A27DB-BD31-4B8C-83A1-F6EECF244321}">
-                <p14:modId xmlns:p14="http://schemas.microsoft.com/office/powerpoint/2010/main" val="4164474727"/>
+                <p14:modId xmlns:p14="http://schemas.microsoft.com/office/powerpoint/2010/main" val="3115668103"/>
               </p:ext>
             </p:extLst>
           </p:nvPr>
@@ -20522,13 +20507,8 @@
                       </a:r>
                       <a:r>
                         <a:rPr lang="ru-RU" dirty="0"/>
-                        <a:t>МФТИ,</a:t>
-                      </a:r>
-                      <a:r>
-                        <a:rPr lang="ru-RU" baseline="0" dirty="0"/>
-                        <a:t> 2016</a:t>
-                      </a:r>
-                      <a:endParaRPr lang="ru-RU" dirty="0"/>
+                        <a:t>МФТИ</a:t>
+                      </a:r>
                     </a:p>
                   </a:txBody>
                   <a:tcPr/>

</xml_diff>